<commit_message>
Updates for book data
</commit_message>
<xml_diff>
--- a/Week7ProgressFinal.pptx
+++ b/Week7ProgressFinal.pptx
@@ -1407,8 +1407,8 @@
         </p:nvSpPr>
         <p:spPr>
           <a:xfrm>
-            <a:off x="1143225" y="685800"/>
-            <a:ext cx="4572225" cy="3429000"/>
+            <a:off x="381000" y="685800"/>
+            <a:ext cx="6096000" cy="3429000"/>
           </a:xfrm>
           <a:custGeom>
             <a:avLst/>
@@ -15279,7 +15279,7 @@
         </p:spPr>
         <p:txBody>
           <a:bodyPr spcFirstLastPara="1" wrap="square" lIns="91425" tIns="45700" rIns="91425" bIns="45700" anchor="t" anchorCtr="0">
-            <a:normAutofit fontScale="85000" lnSpcReduction="20000"/>
+            <a:normAutofit fontScale="92500" lnSpcReduction="10000"/>
           </a:bodyPr>
           <a:lstStyle/>
           <a:p>
@@ -15297,10 +15297,10 @@
               <a:buChar char="•"/>
             </a:pPr>
             <a:r>
-              <a:rPr lang="en-US"/>
+              <a:rPr lang="en-US" dirty="0"/>
               <a:t>Successfully pulled it into pandas</a:t>
             </a:r>
-            <a:endParaRPr/>
+            <a:endParaRPr dirty="0"/>
           </a:p>
           <a:p>
             <a:pPr marL="228600" lvl="0" indent="-228600" algn="l" rtl="0">
@@ -15317,13 +15317,13 @@
               <a:buChar char="•"/>
             </a:pPr>
             <a:r>
-              <a:rPr lang="en-US"/>
-              <a:t>Show number of reviews per year</a:t>
+              <a:rPr lang="en-US" dirty="0"/>
+              <a:t>We can match on book title but currently need to do a better merge than just left join since we care about the year </a:t>
             </a:r>
-            <a:endParaRPr/>
+            <a:endParaRPr dirty="0"/>
           </a:p>
           <a:p>
-            <a:pPr marL="228600" lvl="0" indent="-228600" algn="l" rtl="0">
+            <a:pPr marL="457200" lvl="1" indent="-228600" algn="l" rtl="0">
               <a:lnSpc>
                 <a:spcPct val="100000"/>
               </a:lnSpc>
@@ -15337,10 +15337,10 @@
               <a:buChar char="•"/>
             </a:pPr>
             <a:r>
-              <a:rPr lang="en-US"/>
-              <a:t>We can match on book title but currently need to do a better merge than just left join since we care about the year </a:t>
+              <a:rPr lang="en-US" dirty="0"/>
+              <a:t>Have not fully implemented this yet</a:t>
             </a:r>
-            <a:endParaRPr/>
+            <a:endParaRPr dirty="0"/>
           </a:p>
           <a:p>
             <a:pPr marL="457200" lvl="1" indent="-228600" algn="l" rtl="0">
@@ -15357,10 +15357,10 @@
               <a:buChar char="•"/>
             </a:pPr>
             <a:r>
-              <a:rPr lang="en-US"/>
-              <a:t>Have not fully implemented this yet</a:t>
+              <a:rPr lang="en-US" dirty="0"/>
+              <a:t>Make a second version of the book review data where we keep just the first 30 reviews of each book since we want to know long term if we can predict if a book will make the top 100 by its initial reviews </a:t>
             </a:r>
-            <a:endParaRPr/>
+            <a:endParaRPr dirty="0"/>
           </a:p>
           <a:p>
             <a:pPr marL="457200" lvl="1" indent="-228600" algn="l" rtl="0">
@@ -15377,13 +15377,21 @@
               <a:buChar char="•"/>
             </a:pPr>
             <a:r>
-              <a:rPr lang="en-US"/>
-              <a:t>Make a second version of the book review data where we keep just the first 30 reviews of each book since we want to know long term if we can predict if a book will make the top 100 by its initial review </a:t>
+              <a:rPr lang="en-US" dirty="0"/>
+              <a:t>Title, first review date, 30</a:t>
             </a:r>
-            <a:endParaRPr/>
+            <a:r>
+              <a:rPr lang="en-US" baseline="30000" dirty="0"/>
+              <a:t>th</a:t>
+            </a:r>
+            <a:r>
+              <a:rPr lang="en-US" dirty="0"/>
+              <a:t> review date, all 30 reviews, top 100 yes or no (one line of new dataset) </a:t>
+            </a:r>
+            <a:endParaRPr dirty="0"/>
           </a:p>
           <a:p>
-            <a:pPr marL="457200" lvl="1" indent="-228600" algn="l" rtl="0">
+            <a:pPr marL="685800" lvl="2" indent="-228600" algn="l" rtl="0">
               <a:lnSpc>
                 <a:spcPct val="100000"/>
               </a:lnSpc>
@@ -15397,38 +15405,10 @@
               <a:buChar char="•"/>
             </a:pPr>
             <a:r>
-              <a:rPr lang="en-US"/>
-              <a:t>Title, first review date, 30</a:t>
+              <a:rPr lang="en-US" dirty="0"/>
+              <a:t>If we do this then might not need to merge, simply check each title if it is in corresponding top 100 list or not </a:t>
             </a:r>
-            <a:r>
-              <a:rPr lang="en-US" baseline="30000"/>
-              <a:t>th</a:t>
-            </a:r>
-            <a:r>
-              <a:rPr lang="en-US"/>
-              <a:t> review date, all 30 reviews, top 100 yes or no (one line of new dataset) </a:t>
-            </a:r>
-            <a:endParaRPr/>
-          </a:p>
-          <a:p>
-            <a:pPr marL="685800" lvl="2" indent="-228600" algn="l" rtl="0">
-              <a:lnSpc>
-                <a:spcPct val="100000"/>
-              </a:lnSpc>
-              <a:spcBef>
-                <a:spcPts val="1000"/>
-              </a:spcBef>
-              <a:spcAft>
-                <a:spcPts val="0"/>
-              </a:spcAft>
-              <a:buSzPct val="100000"/>
-              <a:buChar char="•"/>
-            </a:pPr>
-            <a:r>
-              <a:rPr lang="en-US"/>
-              <a:t>Might not need to do a merge if we do it this way. Just check each title if it is in corresponding top 100 list or not </a:t>
-            </a:r>
-            <a:endParaRPr/>
+            <a:endParaRPr dirty="0"/>
           </a:p>
           <a:p>
             <a:pPr marL="457200" lvl="1" indent="-142240" algn="l" rtl="0">
@@ -15444,7 +15424,7 @@
               <a:buSzPct val="100000"/>
               <a:buNone/>
             </a:pPr>
-            <a:endParaRPr/>
+            <a:endParaRPr dirty="0"/>
           </a:p>
         </p:txBody>
       </p:sp>
@@ -17228,20 +17208,38 @@
           </a:bodyPr>
           <a:lstStyle/>
           <a:p>
-            <a:pPr marL="228600" lvl="0" indent="-114300" algn="l" rtl="0">
-              <a:lnSpc>
-                <a:spcPct val="100000"/>
-              </a:lnSpc>
-              <a:spcBef>
-                <a:spcPts val="0"/>
-              </a:spcBef>
-              <a:spcAft>
-                <a:spcPts val="0"/>
-              </a:spcAft>
-              <a:buSzPts val="1800"/>
-              <a:buNone/>
+            <a:pPr>
+              <a:spcBef>
+                <a:spcPts val="0"/>
+              </a:spcBef>
             </a:pPr>
-            <a:endParaRPr/>
+            <a:r>
+              <a:rPr lang="en-US" dirty="0"/>
+              <a:t>Book Review Updates</a:t>
+            </a:r>
+          </a:p>
+          <a:p>
+            <a:pPr>
+              <a:spcBef>
+                <a:spcPts val="0"/>
+              </a:spcBef>
+            </a:pPr>
+            <a:r>
+              <a:rPr lang="en-US" dirty="0"/>
+              <a:t>Electronics Review Updates</a:t>
+            </a:r>
+          </a:p>
+          <a:p>
+            <a:pPr>
+              <a:spcBef>
+                <a:spcPts val="0"/>
+              </a:spcBef>
+            </a:pPr>
+            <a:r>
+              <a:rPr lang="en-US" dirty="0"/>
+              <a:t>Mobile-Electronic Review Updates</a:t>
+            </a:r>
+            <a:endParaRPr dirty="0"/>
           </a:p>
         </p:txBody>
       </p:sp>

</xml_diff>